<commit_message>
Changed order of the databse slides
</commit_message>
<xml_diff>
--- a/docs/Project Presentation.pptx
+++ b/docs/Project Presentation.pptx
@@ -31,11 +31,11 @@
     <p:sldId id="277" r:id="rId22"/>
     <p:sldId id="260" r:id="rId23"/>
     <p:sldId id="267" r:id="rId24"/>
-    <p:sldId id="278" r:id="rId25"/>
-    <p:sldId id="279" r:id="rId26"/>
-    <p:sldId id="280" r:id="rId27"/>
-    <p:sldId id="281" r:id="rId28"/>
-    <p:sldId id="282" r:id="rId29"/>
+    <p:sldId id="280" r:id="rId25"/>
+    <p:sldId id="281" r:id="rId26"/>
+    <p:sldId id="282" r:id="rId27"/>
+    <p:sldId id="278" r:id="rId28"/>
+    <p:sldId id="279" r:id="rId29"/>
     <p:sldId id="261" r:id="rId30"/>
   </p:sldIdLst>
   <p:sldSz cx="12192000" cy="6858000"/>
@@ -239,7 +239,7 @@
           <a:p>
             <a:fld id="{23CEAAF3-9831-450B-8D59-2C09DB96C8FC}" type="datetimeFigureOut">
               <a:rPr lang="en-US"/>
-              <a:t>4/5/2017</a:t>
+              <a:t>4/6/2017</a:t>
             </a:fld>
             <a:endParaRPr/>
           </a:p>
@@ -404,7 +404,7 @@
           <a:p>
             <a:fld id="{2D50CD79-FC16-4410-AB61-17F26E6D3BC8}" type="datetimeFigureOut">
               <a:rPr lang="en-US"/>
-              <a:t>4/5/2017</a:t>
+              <a:t>4/6/2017</a:t>
             </a:fld>
             <a:endParaRPr/>
           </a:p>
@@ -1046,7 +1046,7 @@
             <a:fld id="{402B9795-92DC-40DC-A1CA-9A4B349D7824}" type="datetimeFigureOut">
               <a:rPr lang="en-US" smtClean="0"/>
               <a:pPr/>
-              <a:t>4/5/2017</a:t>
+              <a:t>4/6/2017</a:t>
             </a:fld>
             <a:endParaRPr lang="en-US" dirty="0"/>
           </a:p>
@@ -1328,7 +1328,7 @@
           <a:p>
             <a:fld id="{402B9795-92DC-40DC-A1CA-9A4B349D7824}" type="datetimeFigureOut">
               <a:rPr lang="en-US"/>
-              <a:t>4/5/2017</a:t>
+              <a:t>4/6/2017</a:t>
             </a:fld>
             <a:endParaRPr/>
           </a:p>
@@ -1498,7 +1498,7 @@
           <a:p>
             <a:fld id="{402B9795-92DC-40DC-A1CA-9A4B349D7824}" type="datetimeFigureOut">
               <a:rPr lang="en-US"/>
-              <a:t>4/5/2017</a:t>
+              <a:t>4/6/2017</a:t>
             </a:fld>
             <a:endParaRPr/>
           </a:p>
@@ -1678,7 +1678,7 @@
           <a:p>
             <a:fld id="{402B9795-92DC-40DC-A1CA-9A4B349D7824}" type="datetimeFigureOut">
               <a:rPr lang="en-US"/>
-              <a:t>4/5/2017</a:t>
+              <a:t>4/6/2017</a:t>
             </a:fld>
             <a:endParaRPr/>
           </a:p>
@@ -1974,7 +1974,7 @@
           <a:p>
             <a:fld id="{402B9795-92DC-40DC-A1CA-9A4B349D7824}" type="datetimeFigureOut">
               <a:rPr lang="en-US"/>
-              <a:t>4/5/2017</a:t>
+              <a:t>4/6/2017</a:t>
             </a:fld>
             <a:endParaRPr/>
           </a:p>
@@ -2857,7 +2857,7 @@
           <a:p>
             <a:fld id="{402B9795-92DC-40DC-A1CA-9A4B349D7824}" type="datetimeFigureOut">
               <a:rPr lang="en-US"/>
-              <a:t>4/5/2017</a:t>
+              <a:t>4/6/2017</a:t>
             </a:fld>
             <a:endParaRPr/>
           </a:p>
@@ -3118,7 +3118,7 @@
           <a:p>
             <a:fld id="{402B9795-92DC-40DC-A1CA-9A4B349D7824}" type="datetimeFigureOut">
               <a:rPr lang="en-US"/>
-              <a:t>4/5/2017</a:t>
+              <a:t>4/6/2017</a:t>
             </a:fld>
             <a:endParaRPr/>
           </a:p>
@@ -3486,7 +3486,7 @@
           <a:p>
             <a:fld id="{402B9795-92DC-40DC-A1CA-9A4B349D7824}" type="datetimeFigureOut">
               <a:rPr lang="en-US"/>
-              <a:t>4/5/2017</a:t>
+              <a:t>4/6/2017</a:t>
             </a:fld>
             <a:endParaRPr/>
           </a:p>
@@ -3608,7 +3608,7 @@
           <a:p>
             <a:fld id="{402B9795-92DC-40DC-A1CA-9A4B349D7824}" type="datetimeFigureOut">
               <a:rPr lang="en-US"/>
-              <a:t>4/5/2017</a:t>
+              <a:t>4/6/2017</a:t>
             </a:fld>
             <a:endParaRPr/>
           </a:p>
@@ -3703,7 +3703,7 @@
           <a:p>
             <a:fld id="{402B9795-92DC-40DC-A1CA-9A4B349D7824}" type="datetimeFigureOut">
               <a:rPr lang="en-US"/>
-              <a:t>4/5/2017</a:t>
+              <a:t>4/6/2017</a:t>
             </a:fld>
             <a:endParaRPr/>
           </a:p>
@@ -3982,7 +3982,7 @@
           <a:p>
             <a:fld id="{402B9795-92DC-40DC-A1CA-9A4B349D7824}" type="datetimeFigureOut">
               <a:rPr lang="en-US"/>
-              <a:t>4/5/2017</a:t>
+              <a:t>4/6/2017</a:t>
             </a:fld>
             <a:endParaRPr/>
           </a:p>
@@ -4196,7 +4196,7 @@
             <a:fld id="{402B9795-92DC-40DC-A1CA-9A4B349D7824}" type="datetimeFigureOut">
               <a:rPr lang="en-US" smtClean="0"/>
               <a:pPr/>
-              <a:t>4/5/2017</a:t>
+              <a:t>4/6/2017</a:t>
             </a:fld>
             <a:endParaRPr lang="en-US"/>
           </a:p>
@@ -6234,6 +6234,294 @@
           <a:p>
             <a:r>
               <a:rPr lang="en-CA" dirty="0"/>
+              <a:t>Member</a:t>
+            </a:r>
+          </a:p>
+        </p:txBody>
+      </p:sp>
+      <p:pic>
+        <p:nvPicPr>
+          <p:cNvPr id="5" name="Content Placeholder 4"/>
+          <p:cNvPicPr>
+            <a:picLocks noGrp="1" noChangeAspect="1"/>
+          </p:cNvPicPr>
+          <p:nvPr>
+            <p:ph idx="1"/>
+          </p:nvPr>
+        </p:nvPicPr>
+        <p:blipFill>
+          <a:blip r:embed="rId2">
+            <a:extLst>
+              <a:ext uri="{28A0092B-C50C-407E-A947-70E740481C1C}">
+                <a14:useLocalDpi xmlns:a14="http://schemas.microsoft.com/office/drawing/2010/main" val="0"/>
+              </a:ext>
+            </a:extLst>
+          </a:blip>
+          <a:stretch>
+            <a:fillRect/>
+          </a:stretch>
+        </p:blipFill>
+        <p:spPr>
+          <a:xfrm>
+            <a:off x="1301020" y="1757150"/>
+            <a:ext cx="9589960" cy="3851798"/>
+          </a:xfrm>
+          <a:prstGeom prst="rect">
+            <a:avLst/>
+          </a:prstGeom>
+          <a:ln w="76200" cap="sq" cmpd="thickThin">
+            <a:solidFill>
+              <a:schemeClr val="tx1"/>
+            </a:solidFill>
+            <a:prstDash val="solid"/>
+            <a:miter lim="800000"/>
+          </a:ln>
+          <a:effectLst>
+            <a:innerShdw blurRad="76200">
+              <a:srgbClr val="000000"/>
+            </a:innerShdw>
+          </a:effectLst>
+        </p:spPr>
+      </p:pic>
+    </p:spTree>
+    <p:extLst>
+      <p:ext uri="{BB962C8B-B14F-4D97-AF65-F5344CB8AC3E}">
+        <p14:creationId xmlns:p14="http://schemas.microsoft.com/office/powerpoint/2010/main" val="3355702948"/>
+      </p:ext>
+    </p:extLst>
+  </p:cSld>
+  <p:clrMapOvr>
+    <a:masterClrMapping/>
+  </p:clrMapOvr>
+</p:sld>
+</file>
+
+<file path=ppt/slides/slide22.xml><?xml version="1.0" encoding="utf-8"?>
+<p:sld xmlns:a="http://schemas.openxmlformats.org/drawingml/2006/main" xmlns:r="http://schemas.openxmlformats.org/officeDocument/2006/relationships" xmlns:p="http://schemas.openxmlformats.org/presentationml/2006/main">
+  <p:cSld>
+    <p:spTree>
+      <p:nvGrpSpPr>
+        <p:cNvPr id="1" name=""/>
+        <p:cNvGrpSpPr/>
+        <p:nvPr/>
+      </p:nvGrpSpPr>
+      <p:grpSpPr>
+        <a:xfrm>
+          <a:off x="0" y="0"/>
+          <a:ext cx="0" cy="0"/>
+          <a:chOff x="0" y="0"/>
+          <a:chExt cx="0" cy="0"/>
+        </a:xfrm>
+      </p:grpSpPr>
+      <p:sp>
+        <p:nvSpPr>
+          <p:cNvPr id="2" name="Title 1"/>
+          <p:cNvSpPr>
+            <a:spLocks noGrp="1"/>
+          </p:cNvSpPr>
+          <p:nvPr>
+            <p:ph type="title"/>
+          </p:nvPr>
+        </p:nvSpPr>
+        <p:spPr/>
+        <p:txBody>
+          <a:bodyPr/>
+          <a:lstStyle/>
+          <a:p>
+            <a:r>
+              <a:rPr lang="en-CA" dirty="0"/>
+              <a:t>Provider</a:t>
+            </a:r>
+          </a:p>
+        </p:txBody>
+      </p:sp>
+      <p:pic>
+        <p:nvPicPr>
+          <p:cNvPr id="5" name="Content Placeholder 4"/>
+          <p:cNvPicPr>
+            <a:picLocks noGrp="1" noChangeAspect="1"/>
+          </p:cNvPicPr>
+          <p:nvPr>
+            <p:ph idx="1"/>
+          </p:nvPr>
+        </p:nvPicPr>
+        <p:blipFill>
+          <a:blip r:embed="rId2">
+            <a:extLst>
+              <a:ext uri="{28A0092B-C50C-407E-A947-70E740481C1C}">
+                <a14:useLocalDpi xmlns:a14="http://schemas.microsoft.com/office/drawing/2010/main" val="0"/>
+              </a:ext>
+            </a:extLst>
+          </a:blip>
+          <a:stretch>
+            <a:fillRect/>
+          </a:stretch>
+        </p:blipFill>
+        <p:spPr>
+          <a:xfrm>
+            <a:off x="987005" y="1723534"/>
+            <a:ext cx="10216472" cy="4328474"/>
+          </a:xfrm>
+          <a:prstGeom prst="rect">
+            <a:avLst/>
+          </a:prstGeom>
+          <a:ln w="76200" cap="sq" cmpd="thickThin">
+            <a:solidFill>
+              <a:schemeClr val="tx1"/>
+            </a:solidFill>
+            <a:prstDash val="solid"/>
+            <a:miter lim="800000"/>
+          </a:ln>
+          <a:effectLst>
+            <a:innerShdw blurRad="76200">
+              <a:srgbClr val="000000"/>
+            </a:innerShdw>
+          </a:effectLst>
+        </p:spPr>
+      </p:pic>
+    </p:spTree>
+    <p:extLst>
+      <p:ext uri="{BB962C8B-B14F-4D97-AF65-F5344CB8AC3E}">
+        <p14:creationId xmlns:p14="http://schemas.microsoft.com/office/powerpoint/2010/main" val="2575910845"/>
+      </p:ext>
+    </p:extLst>
+  </p:cSld>
+  <p:clrMapOvr>
+    <a:masterClrMapping/>
+  </p:clrMapOvr>
+</p:sld>
+</file>
+
+<file path=ppt/slides/slide23.xml><?xml version="1.0" encoding="utf-8"?>
+<p:sld xmlns:a="http://schemas.openxmlformats.org/drawingml/2006/main" xmlns:r="http://schemas.openxmlformats.org/officeDocument/2006/relationships" xmlns:p="http://schemas.openxmlformats.org/presentationml/2006/main">
+  <p:cSld>
+    <p:spTree>
+      <p:nvGrpSpPr>
+        <p:cNvPr id="1" name=""/>
+        <p:cNvGrpSpPr/>
+        <p:nvPr/>
+      </p:nvGrpSpPr>
+      <p:grpSpPr>
+        <a:xfrm>
+          <a:off x="0" y="0"/>
+          <a:ext cx="0" cy="0"/>
+          <a:chOff x="0" y="0"/>
+          <a:chExt cx="0" cy="0"/>
+        </a:xfrm>
+      </p:grpSpPr>
+      <p:sp>
+        <p:nvSpPr>
+          <p:cNvPr id="2" name="Title 1"/>
+          <p:cNvSpPr>
+            <a:spLocks noGrp="1"/>
+          </p:cNvSpPr>
+          <p:nvPr>
+            <p:ph type="title"/>
+          </p:nvPr>
+        </p:nvSpPr>
+        <p:spPr/>
+        <p:txBody>
+          <a:bodyPr/>
+          <a:lstStyle/>
+          <a:p>
+            <a:r>
+              <a:rPr lang="en-CA" dirty="0"/>
+              <a:t>Provider Directory</a:t>
+            </a:r>
+          </a:p>
+        </p:txBody>
+      </p:sp>
+      <p:pic>
+        <p:nvPicPr>
+          <p:cNvPr id="5" name="Content Placeholder 4"/>
+          <p:cNvPicPr>
+            <a:picLocks noGrp="1" noChangeAspect="1"/>
+          </p:cNvPicPr>
+          <p:nvPr>
+            <p:ph idx="1"/>
+          </p:nvPr>
+        </p:nvPicPr>
+        <p:blipFill>
+          <a:blip r:embed="rId2">
+            <a:extLst>
+              <a:ext uri="{28A0092B-C50C-407E-A947-70E740481C1C}">
+                <a14:useLocalDpi xmlns:a14="http://schemas.microsoft.com/office/drawing/2010/main" val="0"/>
+              </a:ext>
+            </a:extLst>
+          </a:blip>
+          <a:stretch>
+            <a:fillRect/>
+          </a:stretch>
+        </p:blipFill>
+        <p:spPr>
+          <a:xfrm>
+            <a:off x="1127165" y="2014914"/>
+            <a:ext cx="9937671" cy="3740150"/>
+          </a:xfrm>
+          <a:prstGeom prst="rect">
+            <a:avLst/>
+          </a:prstGeom>
+          <a:ln w="76200" cap="sq" cmpd="thickThin">
+            <a:solidFill>
+              <a:schemeClr val="tx1"/>
+            </a:solidFill>
+            <a:prstDash val="solid"/>
+            <a:miter lim="800000"/>
+          </a:ln>
+          <a:effectLst>
+            <a:innerShdw blurRad="76200">
+              <a:srgbClr val="000000"/>
+            </a:innerShdw>
+          </a:effectLst>
+        </p:spPr>
+      </p:pic>
+    </p:spTree>
+    <p:extLst>
+      <p:ext uri="{BB962C8B-B14F-4D97-AF65-F5344CB8AC3E}">
+        <p14:creationId xmlns:p14="http://schemas.microsoft.com/office/powerpoint/2010/main" val="1774408627"/>
+      </p:ext>
+    </p:extLst>
+  </p:cSld>
+  <p:clrMapOvr>
+    <a:masterClrMapping/>
+  </p:clrMapOvr>
+</p:sld>
+</file>
+
+<file path=ppt/slides/slide24.xml><?xml version="1.0" encoding="utf-8"?>
+<p:sld xmlns:a="http://schemas.openxmlformats.org/drawingml/2006/main" xmlns:r="http://schemas.openxmlformats.org/officeDocument/2006/relationships" xmlns:p="http://schemas.openxmlformats.org/presentationml/2006/main">
+  <p:cSld>
+    <p:spTree>
+      <p:nvGrpSpPr>
+        <p:cNvPr id="1" name=""/>
+        <p:cNvGrpSpPr/>
+        <p:nvPr/>
+      </p:nvGrpSpPr>
+      <p:grpSpPr>
+        <a:xfrm>
+          <a:off x="0" y="0"/>
+          <a:ext cx="0" cy="0"/>
+          <a:chOff x="0" y="0"/>
+          <a:chExt cx="0" cy="0"/>
+        </a:xfrm>
+      </p:grpSpPr>
+      <p:sp>
+        <p:nvSpPr>
+          <p:cNvPr id="2" name="Title 1"/>
+          <p:cNvSpPr>
+            <a:spLocks noGrp="1"/>
+          </p:cNvSpPr>
+          <p:nvPr>
+            <p:ph type="title"/>
+          </p:nvPr>
+        </p:nvSpPr>
+        <p:spPr/>
+        <p:txBody>
+          <a:bodyPr/>
+          <a:lstStyle/>
+          <a:p>
+            <a:r>
+              <a:rPr lang="en-CA" dirty="0"/>
               <a:t>Appointment</a:t>
             </a:r>
           </a:p>
@@ -6296,7 +6584,7 @@
 </p:sld>
 </file>
 
-<file path=ppt/slides/slide22.xml><?xml version="1.0" encoding="utf-8"?>
+<file path=ppt/slides/slide25.xml><?xml version="1.0" encoding="utf-8"?>
 <p:sld xmlns:a="http://schemas.openxmlformats.org/drawingml/2006/main" xmlns:r="http://schemas.openxmlformats.org/officeDocument/2006/relationships" xmlns:p="http://schemas.openxmlformats.org/presentationml/2006/main">
   <p:cSld>
     <p:spTree>
@@ -6383,294 +6671,6 @@
     <p:extLst>
       <p:ext uri="{BB962C8B-B14F-4D97-AF65-F5344CB8AC3E}">
         <p14:creationId xmlns:p14="http://schemas.microsoft.com/office/powerpoint/2010/main" val="983344047"/>
-      </p:ext>
-    </p:extLst>
-  </p:cSld>
-  <p:clrMapOvr>
-    <a:masterClrMapping/>
-  </p:clrMapOvr>
-</p:sld>
-</file>
-
-<file path=ppt/slides/slide23.xml><?xml version="1.0" encoding="utf-8"?>
-<p:sld xmlns:a="http://schemas.openxmlformats.org/drawingml/2006/main" xmlns:r="http://schemas.openxmlformats.org/officeDocument/2006/relationships" xmlns:p="http://schemas.openxmlformats.org/presentationml/2006/main">
-  <p:cSld>
-    <p:spTree>
-      <p:nvGrpSpPr>
-        <p:cNvPr id="1" name=""/>
-        <p:cNvGrpSpPr/>
-        <p:nvPr/>
-      </p:nvGrpSpPr>
-      <p:grpSpPr>
-        <a:xfrm>
-          <a:off x="0" y="0"/>
-          <a:ext cx="0" cy="0"/>
-          <a:chOff x="0" y="0"/>
-          <a:chExt cx="0" cy="0"/>
-        </a:xfrm>
-      </p:grpSpPr>
-      <p:sp>
-        <p:nvSpPr>
-          <p:cNvPr id="2" name="Title 1"/>
-          <p:cNvSpPr>
-            <a:spLocks noGrp="1"/>
-          </p:cNvSpPr>
-          <p:nvPr>
-            <p:ph type="title"/>
-          </p:nvPr>
-        </p:nvSpPr>
-        <p:spPr/>
-        <p:txBody>
-          <a:bodyPr/>
-          <a:lstStyle/>
-          <a:p>
-            <a:r>
-              <a:rPr lang="en-CA" dirty="0"/>
-              <a:t>Member</a:t>
-            </a:r>
-          </a:p>
-        </p:txBody>
-      </p:sp>
-      <p:pic>
-        <p:nvPicPr>
-          <p:cNvPr id="5" name="Content Placeholder 4"/>
-          <p:cNvPicPr>
-            <a:picLocks noGrp="1" noChangeAspect="1"/>
-          </p:cNvPicPr>
-          <p:nvPr>
-            <p:ph idx="1"/>
-          </p:nvPr>
-        </p:nvPicPr>
-        <p:blipFill>
-          <a:blip r:embed="rId2">
-            <a:extLst>
-              <a:ext uri="{28A0092B-C50C-407E-A947-70E740481C1C}">
-                <a14:useLocalDpi xmlns:a14="http://schemas.microsoft.com/office/drawing/2010/main" val="0"/>
-              </a:ext>
-            </a:extLst>
-          </a:blip>
-          <a:stretch>
-            <a:fillRect/>
-          </a:stretch>
-        </p:blipFill>
-        <p:spPr>
-          <a:xfrm>
-            <a:off x="1301020" y="1757150"/>
-            <a:ext cx="9589960" cy="3851798"/>
-          </a:xfrm>
-          <a:prstGeom prst="rect">
-            <a:avLst/>
-          </a:prstGeom>
-          <a:ln w="76200" cap="sq" cmpd="thickThin">
-            <a:solidFill>
-              <a:schemeClr val="tx1"/>
-            </a:solidFill>
-            <a:prstDash val="solid"/>
-            <a:miter lim="800000"/>
-          </a:ln>
-          <a:effectLst>
-            <a:innerShdw blurRad="76200">
-              <a:srgbClr val="000000"/>
-            </a:innerShdw>
-          </a:effectLst>
-        </p:spPr>
-      </p:pic>
-    </p:spTree>
-    <p:extLst>
-      <p:ext uri="{BB962C8B-B14F-4D97-AF65-F5344CB8AC3E}">
-        <p14:creationId xmlns:p14="http://schemas.microsoft.com/office/powerpoint/2010/main" val="3355702948"/>
-      </p:ext>
-    </p:extLst>
-  </p:cSld>
-  <p:clrMapOvr>
-    <a:masterClrMapping/>
-  </p:clrMapOvr>
-</p:sld>
-</file>
-
-<file path=ppt/slides/slide24.xml><?xml version="1.0" encoding="utf-8"?>
-<p:sld xmlns:a="http://schemas.openxmlformats.org/drawingml/2006/main" xmlns:r="http://schemas.openxmlformats.org/officeDocument/2006/relationships" xmlns:p="http://schemas.openxmlformats.org/presentationml/2006/main">
-  <p:cSld>
-    <p:spTree>
-      <p:nvGrpSpPr>
-        <p:cNvPr id="1" name=""/>
-        <p:cNvGrpSpPr/>
-        <p:nvPr/>
-      </p:nvGrpSpPr>
-      <p:grpSpPr>
-        <a:xfrm>
-          <a:off x="0" y="0"/>
-          <a:ext cx="0" cy="0"/>
-          <a:chOff x="0" y="0"/>
-          <a:chExt cx="0" cy="0"/>
-        </a:xfrm>
-      </p:grpSpPr>
-      <p:sp>
-        <p:nvSpPr>
-          <p:cNvPr id="2" name="Title 1"/>
-          <p:cNvSpPr>
-            <a:spLocks noGrp="1"/>
-          </p:cNvSpPr>
-          <p:nvPr>
-            <p:ph type="title"/>
-          </p:nvPr>
-        </p:nvSpPr>
-        <p:spPr/>
-        <p:txBody>
-          <a:bodyPr/>
-          <a:lstStyle/>
-          <a:p>
-            <a:r>
-              <a:rPr lang="en-CA" dirty="0"/>
-              <a:t>Provider</a:t>
-            </a:r>
-          </a:p>
-        </p:txBody>
-      </p:sp>
-      <p:pic>
-        <p:nvPicPr>
-          <p:cNvPr id="5" name="Content Placeholder 4"/>
-          <p:cNvPicPr>
-            <a:picLocks noGrp="1" noChangeAspect="1"/>
-          </p:cNvPicPr>
-          <p:nvPr>
-            <p:ph idx="1"/>
-          </p:nvPr>
-        </p:nvPicPr>
-        <p:blipFill>
-          <a:blip r:embed="rId2">
-            <a:extLst>
-              <a:ext uri="{28A0092B-C50C-407E-A947-70E740481C1C}">
-                <a14:useLocalDpi xmlns:a14="http://schemas.microsoft.com/office/drawing/2010/main" val="0"/>
-              </a:ext>
-            </a:extLst>
-          </a:blip>
-          <a:stretch>
-            <a:fillRect/>
-          </a:stretch>
-        </p:blipFill>
-        <p:spPr>
-          <a:xfrm>
-            <a:off x="987005" y="1723534"/>
-            <a:ext cx="10216472" cy="4328474"/>
-          </a:xfrm>
-          <a:prstGeom prst="rect">
-            <a:avLst/>
-          </a:prstGeom>
-          <a:ln w="76200" cap="sq" cmpd="thickThin">
-            <a:solidFill>
-              <a:schemeClr val="tx1"/>
-            </a:solidFill>
-            <a:prstDash val="solid"/>
-            <a:miter lim="800000"/>
-          </a:ln>
-          <a:effectLst>
-            <a:innerShdw blurRad="76200">
-              <a:srgbClr val="000000"/>
-            </a:innerShdw>
-          </a:effectLst>
-        </p:spPr>
-      </p:pic>
-    </p:spTree>
-    <p:extLst>
-      <p:ext uri="{BB962C8B-B14F-4D97-AF65-F5344CB8AC3E}">
-        <p14:creationId xmlns:p14="http://schemas.microsoft.com/office/powerpoint/2010/main" val="2575910845"/>
-      </p:ext>
-    </p:extLst>
-  </p:cSld>
-  <p:clrMapOvr>
-    <a:masterClrMapping/>
-  </p:clrMapOvr>
-</p:sld>
-</file>
-
-<file path=ppt/slides/slide25.xml><?xml version="1.0" encoding="utf-8"?>
-<p:sld xmlns:a="http://schemas.openxmlformats.org/drawingml/2006/main" xmlns:r="http://schemas.openxmlformats.org/officeDocument/2006/relationships" xmlns:p="http://schemas.openxmlformats.org/presentationml/2006/main">
-  <p:cSld>
-    <p:spTree>
-      <p:nvGrpSpPr>
-        <p:cNvPr id="1" name=""/>
-        <p:cNvGrpSpPr/>
-        <p:nvPr/>
-      </p:nvGrpSpPr>
-      <p:grpSpPr>
-        <a:xfrm>
-          <a:off x="0" y="0"/>
-          <a:ext cx="0" cy="0"/>
-          <a:chOff x="0" y="0"/>
-          <a:chExt cx="0" cy="0"/>
-        </a:xfrm>
-      </p:grpSpPr>
-      <p:sp>
-        <p:nvSpPr>
-          <p:cNvPr id="2" name="Title 1"/>
-          <p:cNvSpPr>
-            <a:spLocks noGrp="1"/>
-          </p:cNvSpPr>
-          <p:nvPr>
-            <p:ph type="title"/>
-          </p:nvPr>
-        </p:nvSpPr>
-        <p:spPr/>
-        <p:txBody>
-          <a:bodyPr/>
-          <a:lstStyle/>
-          <a:p>
-            <a:r>
-              <a:rPr lang="en-CA" dirty="0"/>
-              <a:t>Provider Directory</a:t>
-            </a:r>
-          </a:p>
-        </p:txBody>
-      </p:sp>
-      <p:pic>
-        <p:nvPicPr>
-          <p:cNvPr id="5" name="Content Placeholder 4"/>
-          <p:cNvPicPr>
-            <a:picLocks noGrp="1" noChangeAspect="1"/>
-          </p:cNvPicPr>
-          <p:nvPr>
-            <p:ph idx="1"/>
-          </p:nvPr>
-        </p:nvPicPr>
-        <p:blipFill>
-          <a:blip r:embed="rId2">
-            <a:extLst>
-              <a:ext uri="{28A0092B-C50C-407E-A947-70E740481C1C}">
-                <a14:useLocalDpi xmlns:a14="http://schemas.microsoft.com/office/drawing/2010/main" val="0"/>
-              </a:ext>
-            </a:extLst>
-          </a:blip>
-          <a:stretch>
-            <a:fillRect/>
-          </a:stretch>
-        </p:blipFill>
-        <p:spPr>
-          <a:xfrm>
-            <a:off x="1127165" y="2014914"/>
-            <a:ext cx="9937671" cy="3740150"/>
-          </a:xfrm>
-          <a:prstGeom prst="rect">
-            <a:avLst/>
-          </a:prstGeom>
-          <a:ln w="76200" cap="sq" cmpd="thickThin">
-            <a:solidFill>
-              <a:schemeClr val="tx1"/>
-            </a:solidFill>
-            <a:prstDash val="solid"/>
-            <a:miter lim="800000"/>
-          </a:ln>
-          <a:effectLst>
-            <a:innerShdw blurRad="76200">
-              <a:srgbClr val="000000"/>
-            </a:innerShdw>
-          </a:effectLst>
-        </p:spPr>
-      </p:pic>
-    </p:spTree>
-    <p:extLst>
-      <p:ext uri="{BB962C8B-B14F-4D97-AF65-F5344CB8AC3E}">
-        <p14:creationId xmlns:p14="http://schemas.microsoft.com/office/powerpoint/2010/main" val="1774408627"/>
       </p:ext>
     </p:extLst>
   </p:cSld>
@@ -8180,15 +8180,6 @@
 </file>
 
 <file path=customXml/item1.xml><?xml version="1.0" encoding="utf-8"?>
-<?mso-contentType ?>
-<FormTemplates xmlns="http://schemas.microsoft.com/sharepoint/v3/contenttype/forms">
-  <Display>DocumentLibraryForm</Display>
-  <Edit>AssetEditForm</Edit>
-  <New>DocumentLibraryForm</New>
-</FormTemplates>
-</file>
-
-<file path=customXml/item2.xml><?xml version="1.0" encoding="utf-8"?>
 <ct:contentTypeSchema xmlns:ct="http://schemas.microsoft.com/office/2006/metadata/contentType" xmlns:ma="http://schemas.microsoft.com/office/2006/metadata/properties/metaAttributes" ct:_="" ma:_="" ma:contentTypeName="TemplateFile" ma:contentTypeID="0x0101006EDDDB5EE6D98C44930B742096920B300400F5B6D36B3EF94B4E9A635CDF2A18F5B8" ma:contentTypeVersion="72" ma:contentTypeDescription="Create a new document." ma:contentTypeScope="" ma:versionID="a23e56308344d904b51738559c3d67c9">
   <xsd:schema xmlns:xsd="http://www.w3.org/2001/XMLSchema" xmlns:xs="http://www.w3.org/2001/XMLSchema" xmlns:p="http://schemas.microsoft.com/office/2006/metadata/properties" xmlns:ns2="4873beb7-5857-4685-be1f-d57550cc96cc" targetNamespace="http://schemas.microsoft.com/office/2006/metadata/properties" ma:root="true" ma:fieldsID="cd0908cc4600e77bf5da051303e00c8d" ns2:_="">
     <xsd:import namespace="4873beb7-5857-4685-be1f-d57550cc96cc"/>
@@ -9228,6 +9219,15 @@
 </ct:contentTypeSchema>
 </file>
 
+<file path=customXml/item2.xml><?xml version="1.0" encoding="utf-8"?>
+<?mso-contentType ?>
+<FormTemplates xmlns="http://schemas.microsoft.com/sharepoint/v3/contenttype/forms">
+  <Display>DocumentLibraryForm</Display>
+  <Edit>AssetEditForm</Edit>
+  <New>DocumentLibraryForm</New>
+</FormTemplates>
+</file>
+
 <file path=customXml/item3.xml><?xml version="1.0" encoding="utf-8"?>
 <p:properties xmlns:p="http://schemas.microsoft.com/office/2006/metadata/properties" xmlns:xsi="http://www.w3.org/2001/XMLSchema-instance" xmlns:pc="http://schemas.microsoft.com/office/infopath/2007/PartnerControls">
   <documentManagement>
@@ -9355,14 +9355,6 @@
 </file>
 
 <file path=customXml/itemProps1.xml><?xml version="1.0" encoding="utf-8"?>
-<ds:datastoreItem xmlns:ds="http://schemas.openxmlformats.org/officeDocument/2006/customXml" ds:itemID="{561E720F-F05D-4536-9C34-0CFCED65D3B7}">
-  <ds:schemaRefs>
-    <ds:schemaRef ds:uri="http://schemas.microsoft.com/sharepoint/v3/contenttype/forms"/>
-  </ds:schemaRefs>
-</ds:datastoreItem>
-</file>
-
-<file path=customXml/itemProps2.xml><?xml version="1.0" encoding="utf-8"?>
 <ds:datastoreItem xmlns:ds="http://schemas.openxmlformats.org/officeDocument/2006/customXml" ds:itemID="{28C8B9CA-0273-4370-889A-FC05DA5C2FA5}">
   <ds:schemaRefs>
     <ds:schemaRef ds:uri="http://schemas.microsoft.com/office/2006/metadata/contentType"/>
@@ -9376,6 +9368,14 @@
     <ds:schemaRef ds:uri="http://purl.org/dc/elements/1.1/"/>
     <ds:schemaRef ds:uri="http://purl.org/dc/terms/"/>
     <ds:schemaRef ds:uri="http://schemas.microsoft.com/internal/obd"/>
+  </ds:schemaRefs>
+</ds:datastoreItem>
+</file>
+
+<file path=customXml/itemProps2.xml><?xml version="1.0" encoding="utf-8"?>
+<ds:datastoreItem xmlns:ds="http://schemas.openxmlformats.org/officeDocument/2006/customXml" ds:itemID="{561E720F-F05D-4536-9C34-0CFCED65D3B7}">
+  <ds:schemaRefs>
+    <ds:schemaRef ds:uri="http://schemas.microsoft.com/sharepoint/v3/contenttype/forms"/>
   </ds:schemaRefs>
 </ds:datastoreItem>
 </file>

</xml_diff>